<commit_message>
Modifications to manuscript: Conclusion added; corrections made
</commit_message>
<xml_diff>
--- a/papers/NAR_web_server_2009/screen.d/screen.pptx
+++ b/papers/NAR_web_server_2009/screen.d/screen.pptx
@@ -1,6 +1,6 @@
 
 <file path=ppt/presentation.xml><?xml version="1.0" encoding="utf-8"?>
-<p:presentation xmlns:a="http://schemas.openxmlformats.org/drawingml/2006/main" xmlns:r="http://schemas.openxmlformats.org/officeDocument/2006/relationships" xmlns:mc="http://schemas.openxmlformats.org/markup-compatibility/2006" xmlns:mv="urn:schemas-microsoft-com:mac:vml" xmlns:p="http://schemas.openxmlformats.org/presentationml/2006/main" mc:Ignorable="mv" mc:PreserveAttributes="mv:*" saveSubsetFonts="1" autoCompressPictures="0">
+<p:presentation xmlns:a="http://schemas.openxmlformats.org/drawingml/2006/main" xmlns:r="http://schemas.openxmlformats.org/officeDocument/2006/relationships" xmlns:p="http://schemas.openxmlformats.org/presentationml/2006/main" saveSubsetFonts="1" autoCompressPictures="0">
   <p:sldMasterIdLst>
     <p:sldMasterId id="2147483648" r:id="rId1"/>
   </p:sldMasterIdLst>
@@ -9,6 +9,9 @@
   </p:sldIdLst>
   <p:sldSz cx="5943600" cy="8229600"/>
   <p:notesSz cx="6858000" cy="9144000"/>
+  <p:custDataLst>
+    <p:tags r:id="rId3"/>
+  </p:custDataLst>
   <p:defaultTextStyle>
     <a:defPPr>
       <a:defRPr lang="en-US"/>
@@ -108,7 +111,7 @@
 </file>
 
 <file path=ppt/slideLayouts/slideLayout1.xml><?xml version="1.0" encoding="utf-8"?>
-<p:sldLayout xmlns:a="http://schemas.openxmlformats.org/drawingml/2006/main" xmlns:r="http://schemas.openxmlformats.org/officeDocument/2006/relationships" xmlns:mc="http://schemas.openxmlformats.org/markup-compatibility/2006" xmlns:mv="urn:schemas-microsoft-com:mac:vml" xmlns:p="http://schemas.openxmlformats.org/presentationml/2006/main" mc:Ignorable="mv" mc:PreserveAttributes="mv:*" type="title" preserve="1">
+<p:sldLayout xmlns:a="http://schemas.openxmlformats.org/drawingml/2006/main" xmlns:r="http://schemas.openxmlformats.org/officeDocument/2006/relationships" xmlns:p="http://schemas.openxmlformats.org/presentationml/2006/main" type="title" preserve="1">
   <p:cSld name="Title Slide">
     <p:spTree>
       <p:nvGrpSpPr>
@@ -289,7 +292,7 @@
             <a:fld id="{AE2C3D5C-667F-7649-AFC8-2312B975147E}" type="datetimeFigureOut">
               <a:rPr lang="en-US" smtClean="0"/>
               <a:pPr/>
-              <a:t>2/8/10</a:t>
+              <a:t>2/11/2010</a:t>
             </a:fld>
             <a:endParaRPr lang="en-US"/>
           </a:p>
@@ -347,7 +350,7 @@
 </file>
 
 <file path=ppt/slideLayouts/slideLayout10.xml><?xml version="1.0" encoding="utf-8"?>
-<p:sldLayout xmlns:a="http://schemas.openxmlformats.org/drawingml/2006/main" xmlns:r="http://schemas.openxmlformats.org/officeDocument/2006/relationships" xmlns:mc="http://schemas.openxmlformats.org/markup-compatibility/2006" xmlns:mv="urn:schemas-microsoft-com:mac:vml" xmlns:p="http://schemas.openxmlformats.org/presentationml/2006/main" mc:Ignorable="mv" mc:PreserveAttributes="mv:*" type="vertTx" preserve="1">
+<p:sldLayout xmlns:a="http://schemas.openxmlformats.org/drawingml/2006/main" xmlns:r="http://schemas.openxmlformats.org/officeDocument/2006/relationships" xmlns:p="http://schemas.openxmlformats.org/presentationml/2006/main" type="vertTx" preserve="1">
   <p:cSld name="Title and Vertical Text">
     <p:spTree>
       <p:nvGrpSpPr>
@@ -456,7 +459,7 @@
             <a:fld id="{AE2C3D5C-667F-7649-AFC8-2312B975147E}" type="datetimeFigureOut">
               <a:rPr lang="en-US" smtClean="0"/>
               <a:pPr/>
-              <a:t>2/8/10</a:t>
+              <a:t>2/11/2010</a:t>
             </a:fld>
             <a:endParaRPr lang="en-US"/>
           </a:p>
@@ -514,7 +517,7 @@
 </file>
 
 <file path=ppt/slideLayouts/slideLayout11.xml><?xml version="1.0" encoding="utf-8"?>
-<p:sldLayout xmlns:a="http://schemas.openxmlformats.org/drawingml/2006/main" xmlns:r="http://schemas.openxmlformats.org/officeDocument/2006/relationships" xmlns:mc="http://schemas.openxmlformats.org/markup-compatibility/2006" xmlns:mv="urn:schemas-microsoft-com:mac:vml" xmlns:p="http://schemas.openxmlformats.org/presentationml/2006/main" mc:Ignorable="mv" mc:PreserveAttributes="mv:*" type="vertTitleAndTx" preserve="1">
+<p:sldLayout xmlns:a="http://schemas.openxmlformats.org/drawingml/2006/main" xmlns:r="http://schemas.openxmlformats.org/officeDocument/2006/relationships" xmlns:p="http://schemas.openxmlformats.org/presentationml/2006/main" type="vertTitleAndTx" preserve="1">
   <p:cSld name="Vertical Title and Text">
     <p:spTree>
       <p:nvGrpSpPr>
@@ -633,7 +636,7 @@
             <a:fld id="{AE2C3D5C-667F-7649-AFC8-2312B975147E}" type="datetimeFigureOut">
               <a:rPr lang="en-US" smtClean="0"/>
               <a:pPr/>
-              <a:t>2/8/10</a:t>
+              <a:t>2/11/2010</a:t>
             </a:fld>
             <a:endParaRPr lang="en-US"/>
           </a:p>
@@ -691,7 +694,7 @@
 </file>
 
 <file path=ppt/slideLayouts/slideLayout2.xml><?xml version="1.0" encoding="utf-8"?>
-<p:sldLayout xmlns:a="http://schemas.openxmlformats.org/drawingml/2006/main" xmlns:r="http://schemas.openxmlformats.org/officeDocument/2006/relationships" xmlns:mc="http://schemas.openxmlformats.org/markup-compatibility/2006" xmlns:mv="urn:schemas-microsoft-com:mac:vml" xmlns:p="http://schemas.openxmlformats.org/presentationml/2006/main" mc:Ignorable="mv" mc:PreserveAttributes="mv:*" type="obj" preserve="1">
+<p:sldLayout xmlns:a="http://schemas.openxmlformats.org/drawingml/2006/main" xmlns:r="http://schemas.openxmlformats.org/officeDocument/2006/relationships" xmlns:p="http://schemas.openxmlformats.org/presentationml/2006/main" type="obj" preserve="1">
   <p:cSld name="Title and Content">
     <p:spTree>
       <p:nvGrpSpPr>
@@ -800,7 +803,7 @@
             <a:fld id="{AE2C3D5C-667F-7649-AFC8-2312B975147E}" type="datetimeFigureOut">
               <a:rPr lang="en-US" smtClean="0"/>
               <a:pPr/>
-              <a:t>2/8/10</a:t>
+              <a:t>2/11/2010</a:t>
             </a:fld>
             <a:endParaRPr lang="en-US"/>
           </a:p>
@@ -858,7 +861,7 @@
 </file>
 
 <file path=ppt/slideLayouts/slideLayout3.xml><?xml version="1.0" encoding="utf-8"?>
-<p:sldLayout xmlns:a="http://schemas.openxmlformats.org/drawingml/2006/main" xmlns:r="http://schemas.openxmlformats.org/officeDocument/2006/relationships" xmlns:mc="http://schemas.openxmlformats.org/markup-compatibility/2006" xmlns:mv="urn:schemas-microsoft-com:mac:vml" xmlns:p="http://schemas.openxmlformats.org/presentationml/2006/main" mc:Ignorable="mv" mc:PreserveAttributes="mv:*" type="secHead" preserve="1">
+<p:sldLayout xmlns:a="http://schemas.openxmlformats.org/drawingml/2006/main" xmlns:r="http://schemas.openxmlformats.org/officeDocument/2006/relationships" xmlns:p="http://schemas.openxmlformats.org/presentationml/2006/main" type="secHead" preserve="1">
   <p:cSld name="Section Header">
     <p:spTree>
       <p:nvGrpSpPr>
@@ -1043,7 +1046,7 @@
             <a:fld id="{AE2C3D5C-667F-7649-AFC8-2312B975147E}" type="datetimeFigureOut">
               <a:rPr lang="en-US" smtClean="0"/>
               <a:pPr/>
-              <a:t>2/8/10</a:t>
+              <a:t>2/11/2010</a:t>
             </a:fld>
             <a:endParaRPr lang="en-US"/>
           </a:p>
@@ -1101,7 +1104,7 @@
 </file>
 
 <file path=ppt/slideLayouts/slideLayout4.xml><?xml version="1.0" encoding="utf-8"?>
-<p:sldLayout xmlns:a="http://schemas.openxmlformats.org/drawingml/2006/main" xmlns:r="http://schemas.openxmlformats.org/officeDocument/2006/relationships" xmlns:mc="http://schemas.openxmlformats.org/markup-compatibility/2006" xmlns:mv="urn:schemas-microsoft-com:mac:vml" xmlns:p="http://schemas.openxmlformats.org/presentationml/2006/main" mc:Ignorable="mv" mc:PreserveAttributes="mv:*" type="twoObj" preserve="1">
+<p:sldLayout xmlns:a="http://schemas.openxmlformats.org/drawingml/2006/main" xmlns:r="http://schemas.openxmlformats.org/officeDocument/2006/relationships" xmlns:p="http://schemas.openxmlformats.org/presentationml/2006/main" type="twoObj" preserve="1">
   <p:cSld name="Two Content">
     <p:spTree>
       <p:nvGrpSpPr>
@@ -1328,7 +1331,7 @@
             <a:fld id="{AE2C3D5C-667F-7649-AFC8-2312B975147E}" type="datetimeFigureOut">
               <a:rPr lang="en-US" smtClean="0"/>
               <a:pPr/>
-              <a:t>2/8/10</a:t>
+              <a:t>2/11/2010</a:t>
             </a:fld>
             <a:endParaRPr lang="en-US"/>
           </a:p>
@@ -1386,7 +1389,7 @@
 </file>
 
 <file path=ppt/slideLayouts/slideLayout5.xml><?xml version="1.0" encoding="utf-8"?>
-<p:sldLayout xmlns:a="http://schemas.openxmlformats.org/drawingml/2006/main" xmlns:r="http://schemas.openxmlformats.org/officeDocument/2006/relationships" xmlns:mc="http://schemas.openxmlformats.org/markup-compatibility/2006" xmlns:mv="urn:schemas-microsoft-com:mac:vml" xmlns:p="http://schemas.openxmlformats.org/presentationml/2006/main" mc:Ignorable="mv" mc:PreserveAttributes="mv:*" type="twoTxTwoObj" preserve="1">
+<p:sldLayout xmlns:a="http://schemas.openxmlformats.org/drawingml/2006/main" xmlns:r="http://schemas.openxmlformats.org/officeDocument/2006/relationships" xmlns:p="http://schemas.openxmlformats.org/presentationml/2006/main" type="twoTxTwoObj" preserve="1">
   <p:cSld name="Comparison">
     <p:spTree>
       <p:nvGrpSpPr>
@@ -1752,7 +1755,7 @@
             <a:fld id="{AE2C3D5C-667F-7649-AFC8-2312B975147E}" type="datetimeFigureOut">
               <a:rPr lang="en-US" smtClean="0"/>
               <a:pPr/>
-              <a:t>2/8/10</a:t>
+              <a:t>2/11/2010</a:t>
             </a:fld>
             <a:endParaRPr lang="en-US"/>
           </a:p>
@@ -1810,7 +1813,7 @@
 </file>
 
 <file path=ppt/slideLayouts/slideLayout6.xml><?xml version="1.0" encoding="utf-8"?>
-<p:sldLayout xmlns:a="http://schemas.openxmlformats.org/drawingml/2006/main" xmlns:r="http://schemas.openxmlformats.org/officeDocument/2006/relationships" xmlns:mc="http://schemas.openxmlformats.org/markup-compatibility/2006" xmlns:mv="urn:schemas-microsoft-com:mac:vml" xmlns:p="http://schemas.openxmlformats.org/presentationml/2006/main" mc:Ignorable="mv" mc:PreserveAttributes="mv:*" type="titleOnly" preserve="1">
+<p:sldLayout xmlns:a="http://schemas.openxmlformats.org/drawingml/2006/main" xmlns:r="http://schemas.openxmlformats.org/officeDocument/2006/relationships" xmlns:p="http://schemas.openxmlformats.org/presentationml/2006/main" type="titleOnly" preserve="1">
   <p:cSld name="Title Only">
     <p:spTree>
       <p:nvGrpSpPr>
@@ -1867,7 +1870,7 @@
             <a:fld id="{AE2C3D5C-667F-7649-AFC8-2312B975147E}" type="datetimeFigureOut">
               <a:rPr lang="en-US" smtClean="0"/>
               <a:pPr/>
-              <a:t>2/8/10</a:t>
+              <a:t>2/11/2010</a:t>
             </a:fld>
             <a:endParaRPr lang="en-US"/>
           </a:p>
@@ -1925,7 +1928,7 @@
 </file>
 
 <file path=ppt/slideLayouts/slideLayout7.xml><?xml version="1.0" encoding="utf-8"?>
-<p:sldLayout xmlns:a="http://schemas.openxmlformats.org/drawingml/2006/main" xmlns:r="http://schemas.openxmlformats.org/officeDocument/2006/relationships" xmlns:mc="http://schemas.openxmlformats.org/markup-compatibility/2006" xmlns:mv="urn:schemas-microsoft-com:mac:vml" xmlns:p="http://schemas.openxmlformats.org/presentationml/2006/main" mc:Ignorable="mv" mc:PreserveAttributes="mv:*" type="blank" preserve="1">
+<p:sldLayout xmlns:a="http://schemas.openxmlformats.org/drawingml/2006/main" xmlns:r="http://schemas.openxmlformats.org/officeDocument/2006/relationships" xmlns:p="http://schemas.openxmlformats.org/presentationml/2006/main" type="blank" preserve="1">
   <p:cSld name="Blank">
     <p:spTree>
       <p:nvGrpSpPr>
@@ -1959,7 +1962,7 @@
             <a:fld id="{AE2C3D5C-667F-7649-AFC8-2312B975147E}" type="datetimeFigureOut">
               <a:rPr lang="en-US" smtClean="0"/>
               <a:pPr/>
-              <a:t>2/8/10</a:t>
+              <a:t>2/11/2010</a:t>
             </a:fld>
             <a:endParaRPr lang="en-US"/>
           </a:p>
@@ -2017,7 +2020,7 @@
 </file>
 
 <file path=ppt/slideLayouts/slideLayout8.xml><?xml version="1.0" encoding="utf-8"?>
-<p:sldLayout xmlns:a="http://schemas.openxmlformats.org/drawingml/2006/main" xmlns:r="http://schemas.openxmlformats.org/officeDocument/2006/relationships" xmlns:mc="http://schemas.openxmlformats.org/markup-compatibility/2006" xmlns:mv="urn:schemas-microsoft-com:mac:vml" xmlns:p="http://schemas.openxmlformats.org/presentationml/2006/main" mc:Ignorable="mv" mc:PreserveAttributes="mv:*" type="objTx" preserve="1">
+<p:sldLayout xmlns:a="http://schemas.openxmlformats.org/drawingml/2006/main" xmlns:r="http://schemas.openxmlformats.org/officeDocument/2006/relationships" xmlns:p="http://schemas.openxmlformats.org/presentationml/2006/main" type="objTx" preserve="1">
   <p:cSld name="Content with Caption">
     <p:spTree>
       <p:nvGrpSpPr>
@@ -2233,7 +2236,7 @@
             <a:fld id="{AE2C3D5C-667F-7649-AFC8-2312B975147E}" type="datetimeFigureOut">
               <a:rPr lang="en-US" smtClean="0"/>
               <a:pPr/>
-              <a:t>2/8/10</a:t>
+              <a:t>2/11/2010</a:t>
             </a:fld>
             <a:endParaRPr lang="en-US"/>
           </a:p>
@@ -2291,7 +2294,7 @@
 </file>
 
 <file path=ppt/slideLayouts/slideLayout9.xml><?xml version="1.0" encoding="utf-8"?>
-<p:sldLayout xmlns:a="http://schemas.openxmlformats.org/drawingml/2006/main" xmlns:r="http://schemas.openxmlformats.org/officeDocument/2006/relationships" xmlns:mc="http://schemas.openxmlformats.org/markup-compatibility/2006" xmlns:mv="urn:schemas-microsoft-com:mac:vml" xmlns:p="http://schemas.openxmlformats.org/presentationml/2006/main" mc:Ignorable="mv" mc:PreserveAttributes="mv:*" type="picTx" preserve="1">
+<p:sldLayout xmlns:a="http://schemas.openxmlformats.org/drawingml/2006/main" xmlns:r="http://schemas.openxmlformats.org/officeDocument/2006/relationships" xmlns:p="http://schemas.openxmlformats.org/presentationml/2006/main" type="picTx" preserve="1">
   <p:cSld name="Picture with Caption">
     <p:spTree>
       <p:nvGrpSpPr>
@@ -2483,7 +2486,7 @@
             <a:fld id="{AE2C3D5C-667F-7649-AFC8-2312B975147E}" type="datetimeFigureOut">
               <a:rPr lang="en-US" smtClean="0"/>
               <a:pPr/>
-              <a:t>2/8/10</a:t>
+              <a:t>2/11/2010</a:t>
             </a:fld>
             <a:endParaRPr lang="en-US"/>
           </a:p>
@@ -2541,7 +2544,7 @@
 </file>
 
 <file path=ppt/slideMasters/slideMaster1.xml><?xml version="1.0" encoding="utf-8"?>
-<p:sldMaster xmlns:a="http://schemas.openxmlformats.org/drawingml/2006/main" xmlns:r="http://schemas.openxmlformats.org/officeDocument/2006/relationships" xmlns:mc="http://schemas.openxmlformats.org/markup-compatibility/2006" xmlns:mv="urn:schemas-microsoft-com:mac:vml" xmlns:p="http://schemas.openxmlformats.org/presentationml/2006/main" mc:Ignorable="mv" mc:PreserveAttributes="mv:*">
+<p:sldMaster xmlns:a="http://schemas.openxmlformats.org/drawingml/2006/main" xmlns:r="http://schemas.openxmlformats.org/officeDocument/2006/relationships" xmlns:p="http://schemas.openxmlformats.org/presentationml/2006/main">
   <p:cSld>
     <p:bg>
       <p:bgRef idx="1001">
@@ -2693,7 +2696,7 @@
             <a:fld id="{AE2C3D5C-667F-7649-AFC8-2312B975147E}" type="datetimeFigureOut">
               <a:rPr lang="en-US" smtClean="0"/>
               <a:pPr/>
-              <a:t>2/8/10</a:t>
+              <a:t>2/11/2010</a:t>
             </a:fld>
             <a:endParaRPr lang="en-US"/>
           </a:p>
@@ -3048,7 +3051,7 @@
 </file>
 
 <file path=ppt/slides/slide1.xml><?xml version="1.0" encoding="utf-8"?>
-<p:sld xmlns:a="http://schemas.openxmlformats.org/drawingml/2006/main" xmlns:r="http://schemas.openxmlformats.org/officeDocument/2006/relationships" xmlns:mc="http://schemas.openxmlformats.org/markup-compatibility/2006" xmlns:mv="urn:schemas-microsoft-com:mac:vml" xmlns:p="http://schemas.openxmlformats.org/presentationml/2006/main" mc:Ignorable="mv" mc:PreserveAttributes="mv:*">
+<p:sld xmlns:a="http://schemas.openxmlformats.org/drawingml/2006/main" xmlns:r="http://schemas.openxmlformats.org/officeDocument/2006/relationships" xmlns:p="http://schemas.openxmlformats.org/presentationml/2006/main">
   <p:cSld>
     <p:spTree>
       <p:nvGrpSpPr>
@@ -3072,7 +3075,7 @@
         </p:nvSpPr>
         <p:spPr>
           <a:xfrm>
-            <a:off x="1314121" y="4446234"/>
+            <a:off x="1314121" y="4506522"/>
             <a:ext cx="445930" cy="369332"/>
           </a:xfrm>
           <a:prstGeom prst="rect">
@@ -3111,7 +3114,7 @@
           <p:nvPr/>
         </p:nvPicPr>
         <p:blipFill>
-          <a:blip r:embed="rId2"/>
+          <a:blip r:embed="rId3"/>
           <a:srcRect l="14480" t="8792" r="15648" b="10053"/>
           <a:stretch>
             <a:fillRect/>
@@ -3125,6 +3128,15 @@
           <a:prstGeom prst="rect">
             <a:avLst/>
           </a:prstGeom>
+          <a:ln w="38100" cap="flat" cmpd="sng" algn="ctr">
+            <a:solidFill>
+              <a:srgbClr val="000000"/>
+            </a:solidFill>
+            <a:prstDash val="solid"/>
+            <a:round/>
+            <a:headEnd type="none" w="med" len="med"/>
+            <a:tailEnd type="none" w="med" len="med"/>
+          </a:ln>
         </p:spPr>
       </p:pic>
       <p:pic>
@@ -3136,7 +3148,7 @@
           <p:nvPr/>
         </p:nvPicPr>
         <p:blipFill>
-          <a:blip r:embed="rId3"/>
+          <a:blip r:embed="rId4"/>
           <a:srcRect l="10147" t="8618" r="10131" b="8550"/>
           <a:stretch>
             <a:fillRect/>
@@ -3144,41 +3156,26 @@
         </p:blipFill>
         <p:spPr>
           <a:xfrm>
-            <a:off x="349404" y="2397183"/>
+            <a:off x="337626" y="2438400"/>
             <a:ext cx="2253174" cy="1679719"/>
           </a:xfrm>
           <a:prstGeom prst="rect">
             <a:avLst/>
           </a:prstGeom>
+          <a:ln w="38100" cap="flat" cmpd="sng" algn="ctr">
+            <a:solidFill>
+              <a:srgbClr val="000000"/>
+            </a:solidFill>
+            <a:prstDash val="solid"/>
+            <a:round/>
+            <a:headEnd type="none" w="med" len="med"/>
+            <a:tailEnd type="none" w="med" len="med"/>
+          </a:ln>
         </p:spPr>
       </p:pic>
       <p:pic>
         <p:nvPicPr>
           <p:cNvPr id="17" name="Picture 16" descr="install_page.tiff"/>
-          <p:cNvPicPr>
-            <a:picLocks noChangeAspect="1"/>
-          </p:cNvPicPr>
-          <p:nvPr/>
-        </p:nvPicPr>
-        <p:blipFill>
-          <a:blip r:embed="rId4"/>
-          <a:stretch>
-            <a:fillRect/>
-          </a:stretch>
-        </p:blipFill>
-        <p:spPr>
-          <a:xfrm>
-            <a:off x="0" y="1"/>
-            <a:ext cx="3341019" cy="2397182"/>
-          </a:xfrm>
-          <a:prstGeom prst="rect">
-            <a:avLst/>
-          </a:prstGeom>
-        </p:spPr>
-      </p:pic>
-      <p:pic>
-        <p:nvPicPr>
-          <p:cNvPr id="18" name="Picture 17" descr="cluster_list.tiff"/>
           <p:cNvPicPr>
             <a:picLocks noChangeAspect="1"/>
           </p:cNvPicPr>
@@ -3192,17 +3189,26 @@
         </p:blipFill>
         <p:spPr>
           <a:xfrm>
-            <a:off x="2602578" y="2397183"/>
-            <a:ext cx="3341022" cy="2397183"/>
+            <a:off x="0" y="1"/>
+            <a:ext cx="3341019" cy="2397182"/>
           </a:xfrm>
           <a:prstGeom prst="rect">
             <a:avLst/>
           </a:prstGeom>
+          <a:ln w="38100" cap="flat" cmpd="sng" algn="ctr">
+            <a:solidFill>
+              <a:srgbClr val="000000"/>
+            </a:solidFill>
+            <a:prstDash val="solid"/>
+            <a:round/>
+            <a:headEnd type="none" w="med" len="med"/>
+            <a:tailEnd type="none" w="med" len="med"/>
+          </a:ln>
         </p:spPr>
       </p:pic>
       <p:pic>
         <p:nvPicPr>
-          <p:cNvPr id="19" name="Picture 18" descr="classifier.tiff"/>
+          <p:cNvPr id="18" name="Picture 17" descr="cluster_list.tiff"/>
           <p:cNvPicPr>
             <a:picLocks noChangeAspect="1"/>
           </p:cNvPicPr>
@@ -3216,12 +3222,54 @@
         </p:blipFill>
         <p:spPr>
           <a:xfrm>
-            <a:off x="562063" y="4794366"/>
+            <a:off x="2590800" y="2438400"/>
+            <a:ext cx="3341022" cy="2397183"/>
+          </a:xfrm>
+          <a:prstGeom prst="rect">
+            <a:avLst/>
+          </a:prstGeom>
+          <a:ln w="38100" cap="flat" cmpd="sng" algn="ctr">
+            <a:solidFill>
+              <a:srgbClr val="000000"/>
+            </a:solidFill>
+            <a:prstDash val="solid"/>
+            <a:round/>
+            <a:headEnd type="none" w="med" len="med"/>
+            <a:tailEnd type="none" w="med" len="med"/>
+          </a:ln>
+        </p:spPr>
+      </p:pic>
+      <p:pic>
+        <p:nvPicPr>
+          <p:cNvPr id="19" name="Picture 18" descr="classifier.tiff"/>
+          <p:cNvPicPr>
+            <a:picLocks noChangeAspect="1"/>
+          </p:cNvPicPr>
+          <p:nvPr/>
+        </p:nvPicPr>
+        <p:blipFill>
+          <a:blip r:embed="rId7"/>
+          <a:stretch>
+            <a:fillRect/>
+          </a:stretch>
+        </p:blipFill>
+        <p:spPr>
+          <a:xfrm>
+            <a:off x="947904" y="4876800"/>
             <a:ext cx="4081030" cy="2928139"/>
           </a:xfrm>
           <a:prstGeom prst="rect">
             <a:avLst/>
           </a:prstGeom>
+          <a:ln w="38100" cap="flat" cmpd="sng" algn="ctr">
+            <a:solidFill>
+              <a:srgbClr val="000000"/>
+            </a:solidFill>
+            <a:prstDash val="solid"/>
+            <a:round/>
+            <a:headEnd type="none" w="med" len="med"/>
+            <a:tailEnd type="none" w="med" len="med"/>
+          </a:ln>
         </p:spPr>
       </p:pic>
       <p:sp>
@@ -3369,6 +3417,9 @@
         </p:txBody>
       </p:sp>
     </p:spTree>
+    <p:custDataLst>
+      <p:tags r:id="rId1"/>
+    </p:custDataLst>
   </p:cSld>
   <p:clrMapOvr>
     <a:masterClrMapping/>
@@ -3381,6 +3432,87 @@
     </p:tnLst>
   </p:timing>
 </p:sld>
+</file>
+
+<file path=ppt/tags/tag1.xml><?xml version="1.0" encoding="utf-8"?>
+<p:tagLst xmlns:a="http://schemas.openxmlformats.org/drawingml/2006/main" xmlns:r="http://schemas.openxmlformats.org/officeDocument/2006/relationships" xmlns:p="http://schemas.openxmlformats.org/presentationml/2006/main">
+  <p:tag name="EXPANDSHOWBAR" val="True"/>
+  <p:tag name="ANSWERNOWTEXT" val="Answer Now"/>
+  <p:tag name="RESPTABLESTYLE" val="-1"/>
+  <p:tag name="ALLOWDUPLICATES" val="False"/>
+  <p:tag name="AUTOADVANCE" val="True"/>
+  <p:tag name="STDCHART" val="1"/>
+  <p:tag name="BUBBLENAMEVISIBLE" val="True"/>
+  <p:tag name="DEFAULTNUMTEAMS" val="5"/>
+  <p:tag name="CUSTOMCELLBACKCOLOR2" val="-13395457"/>
+  <p:tag name="DISPLAYNAME" val="True"/>
+  <p:tag name="GRIDROTATIONINTERVAL" val="2"/>
+  <p:tag name="POLLINGCYCLE" val="2"/>
+  <p:tag name="INCLUDENONRESPONDERS" val="False"/>
+  <p:tag name="ALLOWUSERFEEDBACK" val="True"/>
+  <p:tag name="REALTIMEBACKUPPATH" val="(None)"/>
+  <p:tag name="ADVANCEDSETTINGSVIEW" val="False"/>
+  <p:tag name="FIBDISPLAYKEYWORDS" val="True"/>
+  <p:tag name="USESECONDARYMONITOR" val="True"/>
+  <p:tag name="RESPCOUNTERSTYLE" val="0"/>
+  <p:tag name="NUMRESPONSES" val="1"/>
+  <p:tag name="REVIEWONLY" val="False"/>
+  <p:tag name="TEAMSINLEADERBOARD" val="5"/>
+  <p:tag name="BUBBLEGROUPING" val="3"/>
+  <p:tag name="CUSTOMCELLBACKCOLOR3" val="-268652"/>
+  <p:tag name="DISPLAYDEVICEID" val="True"/>
+  <p:tag name="GRIDPOSITION" val="1"/>
+  <p:tag name="MULTIRESPDIVISOR" val="1"/>
+  <p:tag name="INCORRECTPOINTVALUE" val="0"/>
+  <p:tag name="CHARTSCALE" val="True"/>
+  <p:tag name="TPVERSION" val="2008"/>
+  <p:tag name="ANSWERNOWSTYLE" val="-1"/>
+  <p:tag name="INPUTSOURCE" val="1"/>
+  <p:tag name="ROTATIONINTERVAL" val="2"/>
+  <p:tag name="BUBBLESIZEVISIBLE" val="True"/>
+  <p:tag name="CUSTOMCELLBACKCOLOR1" val="-657956"/>
+  <p:tag name="GRIDOPACITY" val="90"/>
+  <p:tag name="CHARTLABELS" val="0"/>
+  <p:tag name="CORRECTPOINTVALUE" val="1"/>
+  <p:tag name="FIBDISPLAYRESULTS" val="True"/>
+  <p:tag name="SHOWBARVISIBLE" val="True"/>
+  <p:tag name="COUNTDOWNSECONDS" val="10"/>
+  <p:tag name="AUTOUPDATEALIASES" val="True"/>
+  <p:tag name="CUSTOMGRIDBACKCOLOR" val="-2830136"/>
+  <p:tag name="DISPLAYDEVICENUMBER" val="True"/>
+  <p:tag name="RESETCHARTS" val="True"/>
+  <p:tag name="ZEROBASED" val="False"/>
+  <p:tag name="POWERPOINTVERSION" val="12.0"/>
+  <p:tag name="BACKUPSESSIONS" val="True"/>
+  <p:tag name="MAXRESPONDERS" val="5"/>
+  <p:tag name="USESCHEMECOLORS" val="True"/>
+  <p:tag name="PARTLISTDEFAULT" val="0"/>
+  <p:tag name="FIBNUMRESULTS" val="5"/>
+  <p:tag name="RESPCOUNTERFORMAT" val="1"/>
+  <p:tag name="BUBBLEVALUEFORMAT" val="0.0"/>
+  <p:tag name="GRIDSIZE" val="{Width=800, Height=600}"/>
+  <p:tag name="AUTOADJUSTPARTRANGE" val="True"/>
+  <p:tag name="BACKUPMAINTENANCE" val="7"/>
+  <p:tag name="CUSTOMCELLBACKCOLOR4" val="-8355712"/>
+  <p:tag name="REALTIMEBACKUP" val="False"/>
+  <p:tag name="CHARTVALUEFORMAT" val="0%"/>
+  <p:tag name="CHARTCOLORS" val="0"/>
+  <p:tag name="COUNTDOWNSTYLE" val="3"/>
+  <p:tag name="INCLUDEPPT" val="True"/>
+  <p:tag name="CUSTOMCELLFORECOLOR" val="-16777216"/>
+  <p:tag name="PARTICIPANTSINLEADERBOARD" val="5"/>
+  <p:tag name="AUTOSIZEGRID" val="True"/>
+  <p:tag name="BULLETTYPE" val="3"/>
+  <p:tag name="FIBINCLUDEOTHER" val="True"/>
+  <p:tag name="DELIMITERS" val="3.1"/>
+</p:tagLst>
+</file>
+
+<file path=ppt/tags/tag2.xml><?xml version="1.0" encoding="utf-8"?>
+<p:tagLst xmlns:a="http://schemas.openxmlformats.org/drawingml/2006/main" xmlns:r="http://schemas.openxmlformats.org/officeDocument/2006/relationships" xmlns:p="http://schemas.openxmlformats.org/presentationml/2006/main">
+  <p:tag name="NOPREFERENCE" val="False"/>
+  <p:tag name="DELIMITERS" val="3.1"/>
+</p:tagLst>
 </file>
 
 <file path=ppt/theme/theme1.xml><?xml version="1.0" encoding="utf-8"?>

</xml_diff>